<commit_message>
added image size to memory analysis slide
</commit_message>
<xml_diff>
--- a/WeeklyPresentations/update5_04_01.pptx
+++ b/WeeklyPresentations/update5_04_01.pptx
@@ -269,7 +269,7 @@
             <a:fld id="{B61BEF0D-F0BB-DE4B-95CE-6DB70DBA9567}" type="datetimeFigureOut">
               <a:rPr lang="en-US" smtClean="0"/>
               <a:pPr/>
-              <a:t>3/31/2019</a:t>
+              <a:t>4/1/2019</a:t>
             </a:fld>
             <a:endParaRPr lang="en-US" dirty="0"/>
           </a:p>
@@ -469,7 +469,7 @@
             <a:fld id="{B61BEF0D-F0BB-DE4B-95CE-6DB70DBA9567}" type="datetimeFigureOut">
               <a:rPr lang="en-US" smtClean="0"/>
               <a:pPr/>
-              <a:t>3/31/2019</a:t>
+              <a:t>4/1/2019</a:t>
             </a:fld>
             <a:endParaRPr lang="en-US" dirty="0"/>
           </a:p>
@@ -679,7 +679,7 @@
             <a:fld id="{B61BEF0D-F0BB-DE4B-95CE-6DB70DBA9567}" type="datetimeFigureOut">
               <a:rPr lang="en-US" smtClean="0"/>
               <a:pPr/>
-              <a:t>3/31/2019</a:t>
+              <a:t>4/1/2019</a:t>
             </a:fld>
             <a:endParaRPr lang="en-US" dirty="0"/>
           </a:p>
@@ -879,7 +879,7 @@
             <a:fld id="{B61BEF0D-F0BB-DE4B-95CE-6DB70DBA9567}" type="datetimeFigureOut">
               <a:rPr lang="en-US" smtClean="0"/>
               <a:pPr/>
-              <a:t>3/31/2019</a:t>
+              <a:t>4/1/2019</a:t>
             </a:fld>
             <a:endParaRPr lang="en-US" dirty="0"/>
           </a:p>
@@ -1156,7 +1156,7 @@
             <a:fld id="{B61BEF0D-F0BB-DE4B-95CE-6DB70DBA9567}" type="datetimeFigureOut">
               <a:rPr lang="en-US" smtClean="0"/>
               <a:pPr/>
-              <a:t>3/31/2019</a:t>
+              <a:t>4/1/2019</a:t>
             </a:fld>
             <a:endParaRPr lang="en-US" dirty="0"/>
           </a:p>
@@ -1423,7 +1423,7 @@
             <a:fld id="{B61BEF0D-F0BB-DE4B-95CE-6DB70DBA9567}" type="datetimeFigureOut">
               <a:rPr lang="en-US" smtClean="0"/>
               <a:pPr/>
-              <a:t>3/31/2019</a:t>
+              <a:t>4/1/2019</a:t>
             </a:fld>
             <a:endParaRPr lang="en-US" dirty="0"/>
           </a:p>
@@ -1837,7 +1837,7 @@
             <a:fld id="{B61BEF0D-F0BB-DE4B-95CE-6DB70DBA9567}" type="datetimeFigureOut">
               <a:rPr lang="en-US" smtClean="0"/>
               <a:pPr/>
-              <a:t>3/31/2019</a:t>
+              <a:t>4/1/2019</a:t>
             </a:fld>
             <a:endParaRPr lang="en-US" dirty="0"/>
           </a:p>
@@ -1980,7 +1980,7 @@
             <a:fld id="{B61BEF0D-F0BB-DE4B-95CE-6DB70DBA9567}" type="datetimeFigureOut">
               <a:rPr lang="en-US" smtClean="0"/>
               <a:pPr/>
-              <a:t>3/31/2019</a:t>
+              <a:t>4/1/2019</a:t>
             </a:fld>
             <a:endParaRPr lang="en-US" dirty="0"/>
           </a:p>
@@ -2095,7 +2095,7 @@
             <a:fld id="{B61BEF0D-F0BB-DE4B-95CE-6DB70DBA9567}" type="datetimeFigureOut">
               <a:rPr lang="en-US" smtClean="0"/>
               <a:pPr/>
-              <a:t>3/31/2019</a:t>
+              <a:t>4/1/2019</a:t>
             </a:fld>
             <a:endParaRPr lang="en-US" dirty="0"/>
           </a:p>
@@ -2408,7 +2408,7 @@
             <a:fld id="{B61BEF0D-F0BB-DE4B-95CE-6DB70DBA9567}" type="datetimeFigureOut">
               <a:rPr lang="en-US" smtClean="0"/>
               <a:pPr/>
-              <a:t>3/31/2019</a:t>
+              <a:t>4/1/2019</a:t>
             </a:fld>
             <a:endParaRPr lang="en-US" dirty="0"/>
           </a:p>
@@ -2698,7 +2698,7 @@
             <a:fld id="{B61BEF0D-F0BB-DE4B-95CE-6DB70DBA9567}" type="datetimeFigureOut">
               <a:rPr lang="en-US" smtClean="0"/>
               <a:pPr/>
-              <a:t>3/31/2019</a:t>
+              <a:t>4/1/2019</a:t>
             </a:fld>
             <a:endParaRPr lang="en-US" dirty="0"/>
           </a:p>
@@ -2941,7 +2941,7 @@
             <a:fld id="{B61BEF0D-F0BB-DE4B-95CE-6DB70DBA9567}" type="datetimeFigureOut">
               <a:rPr lang="en-US" smtClean="0"/>
               <a:pPr/>
-              <a:t>3/31/2019</a:t>
+              <a:t>4/1/2019</a:t>
             </a:fld>
             <a:endParaRPr lang="en-US" dirty="0"/>
           </a:p>
@@ -4341,6 +4341,23 @@
           <a:p>
             <a:r>
               <a:rPr lang="en-US" altLang="zh-CN" dirty="0"/>
+              <a:t>1 image is </a:t>
+            </a:r>
+            <a:r>
+              <a:rPr lang="en-US" altLang="zh-CN"/>
+              <a:t>32*32*3 bytes </a:t>
+            </a:r>
+            <a:r>
+              <a:rPr lang="en-US" altLang="zh-CN">
+                <a:sym typeface="Wingdings" panose="05000000000000000000" pitchFamily="2" charset="2"/>
+              </a:rPr>
+              <a:t> 3072 bytes</a:t>
+            </a:r>
+            <a:endParaRPr lang="en-US" altLang="zh-CN" dirty="0"/>
+          </a:p>
+          <a:p>
+            <a:r>
+              <a:rPr lang="en-US" altLang="zh-CN" dirty="0"/>
               <a:t>There is 645,120 bytes of BRAM available, can fit all weights and the rest of the BRAM will be used for storing activations</a:t>
             </a:r>
             <a:endParaRPr lang="zh-CN" altLang="en-US" dirty="0"/>

</xml_diff>